<commit_message>
added manuals of MakePES
</commit_message>
<xml_diff>
--- a/doc/MakePES/install_MakePES.pptx
+++ b/doc/MakePES/install_MakePES.pptx
@@ -212,7 +212,7 @@
           <a:p>
             <a:fld id="{E169DC26-B38B-F143-8CF0-891C5D30D367}" type="datetimeFigureOut">
               <a:rPr kumimoji="1" lang="ja-JP" altLang="en-US" smtClean="0"/>
-              <a:t>2019/5/3</a:t>
+              <a:t>2019/5/5</a:t>
             </a:fld>
             <a:endParaRPr kumimoji="1" lang="ja-JP" altLang="en-US"/>
           </a:p>
@@ -642,7 +642,7 @@
           <a:p>
             <a:fld id="{EE7860AB-3E3A-634E-9588-3634E3BE52A0}" type="datetime1">
               <a:rPr kumimoji="1" lang="ja-JP" altLang="en-US" smtClean="0"/>
-              <a:t>2019/5/3</a:t>
+              <a:t>2019/5/5</a:t>
             </a:fld>
             <a:endParaRPr kumimoji="1" lang="ja-JP" altLang="en-US"/>
           </a:p>
@@ -839,7 +839,7 @@
           <a:p>
             <a:fld id="{9F997464-49D2-A046-AC0E-5FDFD3DF665B}" type="datetime1">
               <a:rPr kumimoji="1" lang="ja-JP" altLang="en-US" smtClean="0"/>
-              <a:t>2019/5/3</a:t>
+              <a:t>2019/5/5</a:t>
             </a:fld>
             <a:endParaRPr kumimoji="1" lang="ja-JP" altLang="en-US"/>
           </a:p>
@@ -1046,7 +1046,7 @@
           <a:p>
             <a:fld id="{2CBD1245-BC8C-4342-A14F-D901B9B13210}" type="datetime1">
               <a:rPr kumimoji="1" lang="ja-JP" altLang="en-US" smtClean="0"/>
-              <a:t>2019/5/3</a:t>
+              <a:t>2019/5/5</a:t>
             </a:fld>
             <a:endParaRPr kumimoji="1" lang="ja-JP" altLang="en-US"/>
           </a:p>
@@ -1243,7 +1243,7 @@
           <a:p>
             <a:fld id="{E0FF5DFC-0E6C-E144-A5DD-E851AA0EE050}" type="datetime1">
               <a:rPr kumimoji="1" lang="ja-JP" altLang="en-US" smtClean="0"/>
-              <a:t>2019/5/3</a:t>
+              <a:t>2019/5/5</a:t>
             </a:fld>
             <a:endParaRPr kumimoji="1" lang="ja-JP" altLang="en-US"/>
           </a:p>
@@ -1482,7 +1482,7 @@
           <a:p>
             <a:fld id="{1373E6F4-CB37-3348-B268-694CC61CFDE2}" type="datetime1">
               <a:rPr kumimoji="1" lang="ja-JP" altLang="en-US" smtClean="0"/>
-              <a:t>2019/5/3</a:t>
+              <a:t>2019/5/5</a:t>
             </a:fld>
             <a:endParaRPr kumimoji="1" lang="ja-JP" altLang="en-US"/>
           </a:p>
@@ -1773,7 +1773,7 @@
           <a:p>
             <a:fld id="{83203CE9-A62D-D54F-B5B8-E5081BC50FF5}" type="datetime1">
               <a:rPr kumimoji="1" lang="ja-JP" altLang="en-US" smtClean="0"/>
-              <a:t>2019/5/3</a:t>
+              <a:t>2019/5/5</a:t>
             </a:fld>
             <a:endParaRPr kumimoji="1" lang="ja-JP" altLang="en-US"/>
           </a:p>
@@ -2199,7 +2199,7 @@
           <a:p>
             <a:fld id="{8DF792D3-1EAE-B941-8FA8-A45BDC58D538}" type="datetime1">
               <a:rPr kumimoji="1" lang="ja-JP" altLang="en-US" smtClean="0"/>
-              <a:t>2019/5/3</a:t>
+              <a:t>2019/5/5</a:t>
             </a:fld>
             <a:endParaRPr kumimoji="1" lang="ja-JP" altLang="en-US"/>
           </a:p>
@@ -2312,7 +2312,7 @@
           <a:p>
             <a:fld id="{A2976D4D-D591-7843-A186-DB885C000B62}" type="datetime1">
               <a:rPr kumimoji="1" lang="ja-JP" altLang="en-US" smtClean="0"/>
-              <a:t>2019/5/3</a:t>
+              <a:t>2019/5/5</a:t>
             </a:fld>
             <a:endParaRPr kumimoji="1" lang="ja-JP" altLang="en-US"/>
           </a:p>
@@ -2402,7 +2402,7 @@
           <a:p>
             <a:fld id="{71E10034-284E-534E-87ED-A26A40A9A5A4}" type="datetime1">
               <a:rPr kumimoji="1" lang="ja-JP" altLang="en-US" smtClean="0"/>
-              <a:t>2019/5/3</a:t>
+              <a:t>2019/5/5</a:t>
             </a:fld>
             <a:endParaRPr kumimoji="1" lang="ja-JP" altLang="en-US"/>
           </a:p>
@@ -2706,7 +2706,7 @@
           <a:p>
             <a:fld id="{1FB2FB92-4CFC-BF4B-81B2-16888C599581}" type="datetime1">
               <a:rPr kumimoji="1" lang="ja-JP" altLang="en-US" smtClean="0"/>
-              <a:t>2019/5/3</a:t>
+              <a:t>2019/5/5</a:t>
             </a:fld>
             <a:endParaRPr kumimoji="1" lang="ja-JP" altLang="en-US"/>
           </a:p>
@@ -2958,7 +2958,7 @@
           <a:p>
             <a:fld id="{43AF2432-0CDD-C544-BAB3-85372DA356EC}" type="datetime1">
               <a:rPr kumimoji="1" lang="ja-JP" altLang="en-US" smtClean="0"/>
-              <a:t>2019/5/3</a:t>
+              <a:t>2019/5/5</a:t>
             </a:fld>
             <a:endParaRPr kumimoji="1" lang="ja-JP" altLang="en-US"/>
           </a:p>
@@ -3198,7 +3198,7 @@
           <a:p>
             <a:fld id="{4A801117-FCED-794E-BE88-16E7FC9A3D9F}" type="datetime1">
               <a:rPr kumimoji="1" lang="ja-JP" altLang="en-US" smtClean="0"/>
-              <a:t>2019/5/3</a:t>
+              <a:t>2019/5/5</a:t>
             </a:fld>
             <a:endParaRPr kumimoji="1" lang="ja-JP" altLang="en-US"/>
           </a:p>
@@ -4659,7 +4659,7 @@
                 <a:ea typeface="Courier" charset="0"/>
                 <a:cs typeface="Courier" charset="0"/>
               </a:rPr>
-              <a:t>&gt;</a:t>
+              <a:t>&gt; </a:t>
             </a:r>
             <a:r>
               <a:rPr kumimoji="1" lang="en-US" altLang="ja-JP" sz="1200" dirty="0">
@@ -4778,7 +4778,7 @@
         </p:nvSpPr>
         <p:spPr>
           <a:xfrm>
-            <a:off x="1547813" y="3359951"/>
+            <a:off x="1547813" y="3431389"/>
             <a:ext cx="5205271" cy="461665"/>
           </a:xfrm>
           <a:prstGeom prst="rect">
@@ -4811,23 +4811,7 @@
                 <a:ea typeface="Courier" charset="0"/>
                 <a:cs typeface="Courier" charset="0"/>
               </a:rPr>
-              <a:t>=${HOME}/</a:t>
-            </a:r>
-            <a:r>
-              <a:rPr lang="en-US" altLang="ja-JP" sz="1200" dirty="0" err="1">
-                <a:latin typeface="Courier" charset="0"/>
-                <a:ea typeface="Courier" charset="0"/>
-                <a:cs typeface="Courier" charset="0"/>
-              </a:rPr>
-              <a:t>sindo</a:t>
-            </a:r>
-            <a:r>
-              <a:rPr lang="en-US" altLang="ja-JP" sz="1200" dirty="0">
-                <a:latin typeface="Courier" charset="0"/>
-                <a:ea typeface="Courier" charset="0"/>
-                <a:cs typeface="Courier" charset="0"/>
-              </a:rPr>
-              <a:t>/jar</a:t>
+              <a:t>=/path/to/sindo-4.0/jar</a:t>
             </a:r>
           </a:p>
           <a:p>

</xml_diff>

<commit_message>
update document of MakePES
</commit_message>
<xml_diff>
--- a/doc/MakePES/install_MakePES.pptx
+++ b/doc/MakePES/install_MakePES.pptx
@@ -5,14 +5,13 @@
     <p:sldMasterId id="2147483660" r:id="rId1"/>
   </p:sldMasterIdLst>
   <p:notesMasterIdLst>
-    <p:notesMasterId r:id="rId7"/>
+    <p:notesMasterId r:id="rId6"/>
   </p:notesMasterIdLst>
   <p:sldIdLst>
     <p:sldId id="256" r:id="rId2"/>
     <p:sldId id="286" r:id="rId3"/>
     <p:sldId id="285" r:id="rId4"/>
-    <p:sldId id="287" r:id="rId5"/>
-    <p:sldId id="289" r:id="rId6"/>
+    <p:sldId id="290" r:id="rId5"/>
   </p:sldIdLst>
   <p:sldSz cx="9144000" cy="6858000" type="screen4x3"/>
   <p:notesSz cx="6858000" cy="9144000"/>
@@ -212,7 +211,7 @@
           <a:p>
             <a:fld id="{E169DC26-B38B-F143-8CF0-891C5D30D367}" type="datetimeFigureOut">
               <a:rPr kumimoji="1" lang="ja-JP" altLang="en-US" smtClean="0"/>
-              <a:t>2019/5/5</a:t>
+              <a:t>2022/3/12</a:t>
             </a:fld>
             <a:endParaRPr kumimoji="1" lang="ja-JP" altLang="en-US"/>
           </a:p>
@@ -642,7 +641,7 @@
           <a:p>
             <a:fld id="{EE7860AB-3E3A-634E-9588-3634E3BE52A0}" type="datetime1">
               <a:rPr kumimoji="1" lang="ja-JP" altLang="en-US" smtClean="0"/>
-              <a:t>2019/5/5</a:t>
+              <a:t>2022/3/12</a:t>
             </a:fld>
             <a:endParaRPr kumimoji="1" lang="ja-JP" altLang="en-US"/>
           </a:p>
@@ -839,7 +838,7 @@
           <a:p>
             <a:fld id="{9F997464-49D2-A046-AC0E-5FDFD3DF665B}" type="datetime1">
               <a:rPr kumimoji="1" lang="ja-JP" altLang="en-US" smtClean="0"/>
-              <a:t>2019/5/5</a:t>
+              <a:t>2022/3/12</a:t>
             </a:fld>
             <a:endParaRPr kumimoji="1" lang="ja-JP" altLang="en-US"/>
           </a:p>
@@ -1046,7 +1045,7 @@
           <a:p>
             <a:fld id="{2CBD1245-BC8C-4342-A14F-D901B9B13210}" type="datetime1">
               <a:rPr kumimoji="1" lang="ja-JP" altLang="en-US" smtClean="0"/>
-              <a:t>2019/5/5</a:t>
+              <a:t>2022/3/12</a:t>
             </a:fld>
             <a:endParaRPr kumimoji="1" lang="ja-JP" altLang="en-US"/>
           </a:p>
@@ -1243,7 +1242,7 @@
           <a:p>
             <a:fld id="{E0FF5DFC-0E6C-E144-A5DD-E851AA0EE050}" type="datetime1">
               <a:rPr kumimoji="1" lang="ja-JP" altLang="en-US" smtClean="0"/>
-              <a:t>2019/5/5</a:t>
+              <a:t>2022/3/12</a:t>
             </a:fld>
             <a:endParaRPr kumimoji="1" lang="ja-JP" altLang="en-US"/>
           </a:p>
@@ -1482,7 +1481,7 @@
           <a:p>
             <a:fld id="{1373E6F4-CB37-3348-B268-694CC61CFDE2}" type="datetime1">
               <a:rPr kumimoji="1" lang="ja-JP" altLang="en-US" smtClean="0"/>
-              <a:t>2019/5/5</a:t>
+              <a:t>2022/3/12</a:t>
             </a:fld>
             <a:endParaRPr kumimoji="1" lang="ja-JP" altLang="en-US"/>
           </a:p>
@@ -1773,7 +1772,7 @@
           <a:p>
             <a:fld id="{83203CE9-A62D-D54F-B5B8-E5081BC50FF5}" type="datetime1">
               <a:rPr kumimoji="1" lang="ja-JP" altLang="en-US" smtClean="0"/>
-              <a:t>2019/5/5</a:t>
+              <a:t>2022/3/12</a:t>
             </a:fld>
             <a:endParaRPr kumimoji="1" lang="ja-JP" altLang="en-US"/>
           </a:p>
@@ -2199,7 +2198,7 @@
           <a:p>
             <a:fld id="{8DF792D3-1EAE-B941-8FA8-A45BDC58D538}" type="datetime1">
               <a:rPr kumimoji="1" lang="ja-JP" altLang="en-US" smtClean="0"/>
-              <a:t>2019/5/5</a:t>
+              <a:t>2022/3/12</a:t>
             </a:fld>
             <a:endParaRPr kumimoji="1" lang="ja-JP" altLang="en-US"/>
           </a:p>
@@ -2312,7 +2311,7 @@
           <a:p>
             <a:fld id="{A2976D4D-D591-7843-A186-DB885C000B62}" type="datetime1">
               <a:rPr kumimoji="1" lang="ja-JP" altLang="en-US" smtClean="0"/>
-              <a:t>2019/5/5</a:t>
+              <a:t>2022/3/12</a:t>
             </a:fld>
             <a:endParaRPr kumimoji="1" lang="ja-JP" altLang="en-US"/>
           </a:p>
@@ -2402,7 +2401,7 @@
           <a:p>
             <a:fld id="{71E10034-284E-534E-87ED-A26A40A9A5A4}" type="datetime1">
               <a:rPr kumimoji="1" lang="ja-JP" altLang="en-US" smtClean="0"/>
-              <a:t>2019/5/5</a:t>
+              <a:t>2022/3/12</a:t>
             </a:fld>
             <a:endParaRPr kumimoji="1" lang="ja-JP" altLang="en-US"/>
           </a:p>
@@ -2706,7 +2705,7 @@
           <a:p>
             <a:fld id="{1FB2FB92-4CFC-BF4B-81B2-16888C599581}" type="datetime1">
               <a:rPr kumimoji="1" lang="ja-JP" altLang="en-US" smtClean="0"/>
-              <a:t>2019/5/5</a:t>
+              <a:t>2022/3/12</a:t>
             </a:fld>
             <a:endParaRPr kumimoji="1" lang="ja-JP" altLang="en-US"/>
           </a:p>
@@ -2958,7 +2957,7 @@
           <a:p>
             <a:fld id="{43AF2432-0CDD-C544-BAB3-85372DA356EC}" type="datetime1">
               <a:rPr kumimoji="1" lang="ja-JP" altLang="en-US" smtClean="0"/>
-              <a:t>2019/5/5</a:t>
+              <a:t>2022/3/12</a:t>
             </a:fld>
             <a:endParaRPr kumimoji="1" lang="ja-JP" altLang="en-US"/>
           </a:p>
@@ -3198,7 +3197,7 @@
           <a:p>
             <a:fld id="{4A801117-FCED-794E-BE88-16E7FC9A3D9F}" type="datetime1">
               <a:rPr kumimoji="1" lang="ja-JP" altLang="en-US" smtClean="0"/>
-              <a:t>2019/5/5</a:t>
+              <a:t>2022/3/12</a:t>
             </a:fld>
             <a:endParaRPr kumimoji="1" lang="ja-JP" altLang="en-US"/>
           </a:p>
@@ -3681,7 +3680,7 @@
             <a:pPr algn="ctr"/>
             <a:r>
               <a:rPr kumimoji="1" lang="en-US" altLang="ja-JP" dirty="0"/>
-              <a:t>2019/05/14</a:t>
+              <a:t>2022/03/15</a:t>
             </a:r>
             <a:endParaRPr kumimoji="1" lang="ja-JP" altLang="en-US" dirty="0"/>
           </a:p>
@@ -3799,7 +3798,7 @@
         <p:spPr>
           <a:xfrm>
             <a:off x="537029" y="827313"/>
-            <a:ext cx="7864022" cy="1477328"/>
+            <a:ext cx="7864022" cy="2308324"/>
           </a:xfrm>
           <a:prstGeom prst="rect">
             <a:avLst/>
@@ -3821,6 +3820,10 @@
             <a:endParaRPr lang="en-US" altLang="ja-JP" dirty="0"/>
           </a:p>
           <a:p>
+            <a:pPr marL="285750" indent="-285750">
+              <a:buFont typeface="Arial" panose="020B0604020202020204" pitchFamily="34" charset="0"/>
+              <a:buChar char="•"/>
+            </a:pPr>
             <a:r>
               <a:rPr kumimoji="1" lang="en-US" altLang="ja-JP" dirty="0" err="1"/>
               <a:t>MakePES</a:t>
@@ -3837,7 +3840,92 @@
               <a:rPr kumimoji="1" lang="en-US" altLang="ja-JP" dirty="0"/>
               <a:t>This manual assumes that you are familiar with the commands in UNIX, and that you are working on Bourne Shell (bash).</a:t>
             </a:r>
+          </a:p>
+          <a:p>
+            <a:pPr marL="285750" indent="-285750">
+              <a:buFont typeface="Arial" panose="020B0604020202020204" pitchFamily="34" charset="0"/>
+              <a:buChar char="•"/>
+            </a:pPr>
+            <a:endParaRPr lang="en-US" altLang="ja-JP" dirty="0"/>
+          </a:p>
+          <a:p>
+            <a:pPr marL="285750" indent="-285750">
+              <a:buFont typeface="Arial" panose="020B0604020202020204" pitchFamily="34" charset="0"/>
+              <a:buChar char="•"/>
+            </a:pPr>
+            <a:r>
+              <a:rPr lang="en-US" altLang="ja-JP" dirty="0"/>
+              <a:t>“/path/to/sindo” indicates the absolute path of your installation directory. For example, </a:t>
+            </a:r>
             <a:endParaRPr kumimoji="1" lang="ja-JP" altLang="en-US"/>
+          </a:p>
+        </p:txBody>
+      </p:sp>
+      <p:sp>
+        <p:nvSpPr>
+          <p:cNvPr id="4" name="テキスト ボックス 13">
+            <a:extLst>
+              <a:ext uri="{FF2B5EF4-FFF2-40B4-BE49-F238E27FC236}">
+                <a16:creationId xmlns:a16="http://schemas.microsoft.com/office/drawing/2014/main" id="{82477BF1-A0F8-5A44-B158-3C5011D97843}"/>
+              </a:ext>
+            </a:extLst>
+          </p:cNvPr>
+          <p:cNvSpPr txBox="1"/>
+          <p:nvPr/>
+        </p:nvSpPr>
+        <p:spPr>
+          <a:xfrm>
+            <a:off x="1204223" y="3254328"/>
+            <a:ext cx="4740400" cy="276999"/>
+          </a:xfrm>
+          <a:prstGeom prst="rect">
+            <a:avLst/>
+          </a:prstGeom>
+          <a:noFill/>
+          <a:ln>
+            <a:solidFill>
+              <a:srgbClr val="00B050"/>
+            </a:solidFill>
+          </a:ln>
+        </p:spPr>
+        <p:txBody>
+          <a:bodyPr wrap="none" rtlCol="0">
+            <a:spAutoFit/>
+          </a:bodyPr>
+          <a:lstStyle/>
+          <a:p>
+            <a:r>
+              <a:rPr lang="en-US" altLang="ja-JP" sz="1200" dirty="0">
+                <a:latin typeface="Courier" charset="0"/>
+                <a:ea typeface="Courier" charset="0"/>
+                <a:cs typeface="Courier" charset="0"/>
+              </a:rPr>
+              <a:t>/</a:t>
+            </a:r>
+            <a:r>
+              <a:rPr lang="en-US" altLang="ja-JP" sz="1200" dirty="0">
+                <a:solidFill>
+                  <a:srgbClr val="FF0000"/>
+                </a:solidFill>
+                <a:latin typeface="Courier" charset="0"/>
+                <a:ea typeface="Courier" charset="0"/>
+                <a:cs typeface="Courier" charset="0"/>
+              </a:rPr>
+              <a:t>path/to/sindo </a:t>
+            </a:r>
+            <a:r>
+              <a:rPr lang="en-US" altLang="ja-JP" sz="1200" dirty="0">
+                <a:latin typeface="Courier" charset="0"/>
+                <a:ea typeface="Courier" charset="0"/>
+                <a:cs typeface="Courier" charset="0"/>
+              </a:rPr>
+              <a:t>-&gt; /home/yagi/pgm/sindo-4.0_220312</a:t>
+            </a:r>
+            <a:endParaRPr kumimoji="1" lang="ja-JP" altLang="en-US" sz="1200" dirty="0">
+              <a:latin typeface="Courier" charset="0"/>
+              <a:ea typeface="Courier" charset="0"/>
+              <a:cs typeface="Courier" charset="0"/>
+            </a:endParaRPr>
           </a:p>
         </p:txBody>
       </p:sp>
@@ -3914,8 +4002,8 @@
         </p:nvSpPr>
         <p:spPr>
           <a:xfrm>
-            <a:off x="827315" y="1470714"/>
-            <a:ext cx="7888060" cy="4801314"/>
+            <a:off x="827315" y="516121"/>
+            <a:ext cx="7888060" cy="5078313"/>
           </a:xfrm>
           <a:prstGeom prst="rect">
             <a:avLst/>
@@ -3934,89 +4022,32 @@
             </a:pPr>
             <a:r>
               <a:rPr kumimoji="1" lang="en-US" altLang="ja-JP" dirty="0"/>
-              <a:t>Install Java</a:t>
+              <a:t>Install Java JDK</a:t>
             </a:r>
             <a:r>
               <a:rPr lang="en-US" altLang="ja-JP" dirty="0"/>
-              <a:t> in your system.</a:t>
-            </a:r>
-            <a:endParaRPr kumimoji="1" lang="en-US" altLang="ja-JP" dirty="0"/>
+              <a:t> in your system. For details, see “How to Install JSindo”.</a:t>
+            </a:r>
           </a:p>
           <a:p>
             <a:pPr lvl="1"/>
-            <a:r>
-              <a:rPr lang="en-US" altLang="ja-JP" dirty="0"/>
-              <a:t>Visit Oracle Java (</a:t>
-            </a:r>
-            <a:r>
-              <a:rPr lang="en-US" altLang="ja-JP" dirty="0">
-                <a:hlinkClick r:id="rId2"/>
-              </a:rPr>
-              <a:t>https://www.java.com</a:t>
-            </a:r>
-            <a:r>
-              <a:rPr lang="en-US" altLang="ja-JP" dirty="0"/>
-              <a:t>) or </a:t>
-            </a:r>
-            <a:br>
-              <a:rPr lang="en-US" altLang="ja-JP" dirty="0"/>
-            </a:br>
-            <a:r>
-              <a:rPr lang="en-US" altLang="ja-JP" dirty="0"/>
-              <a:t>Open JDK (</a:t>
-            </a:r>
-            <a:r>
-              <a:rPr lang="en-US" altLang="ja-JP" dirty="0">
-                <a:hlinkClick r:id="rId3"/>
-              </a:rPr>
-              <a:t>https://openjdk.java.net/</a:t>
-            </a:r>
-            <a:r>
-              <a:rPr lang="en-US" altLang="ja-JP" dirty="0"/>
-              <a:t>).</a:t>
-            </a:r>
-            <a:endParaRPr kumimoji="1" lang="en-US" altLang="ja-JP" dirty="0"/>
+            <a:endParaRPr lang="en-US" altLang="ja-JP" dirty="0"/>
           </a:p>
           <a:p>
             <a:pPr marL="342900" indent="-342900">
               <a:buFont typeface="+mj-lt"/>
               <a:buAutoNum type="arabicPeriod"/>
             </a:pPr>
-            <a:endParaRPr kumimoji="1" lang="en-US" altLang="ja-JP" dirty="0"/>
-          </a:p>
-          <a:p>
-            <a:pPr marL="342900" indent="-342900">
-              <a:buFont typeface="+mj-lt"/>
-              <a:buAutoNum type="arabicPeriod"/>
-            </a:pPr>
-            <a:r>
-              <a:rPr kumimoji="1" lang="en-US" altLang="ja-JP" dirty="0"/>
-              <a:t>Download JAMA</a:t>
+            <a:r>
+              <a:rPr lang="en-US" altLang="ja-JP" dirty="0"/>
+              <a:t>Download sindo-4.0_xxxx.zip from our website</a:t>
             </a:r>
           </a:p>
           <a:p>
             <a:pPr lvl="1"/>
             <a:r>
               <a:rPr lang="en-US" altLang="ja-JP" dirty="0"/>
-              <a:t>Visit</a:t>
-            </a:r>
-            <a:r>
-              <a:rPr kumimoji="1" lang="en-US" altLang="ja-JP" dirty="0"/>
-              <a:t> </a:t>
-            </a:r>
-            <a:r>
-              <a:rPr lang="en-US" altLang="ja-JP" dirty="0">
-                <a:hlinkClick r:id="rId4"/>
-              </a:rPr>
-              <a:t>https://math.nist.gov/javanumerics/jama/</a:t>
-            </a:r>
-            <a:endParaRPr lang="en-US" altLang="ja-JP" dirty="0"/>
-          </a:p>
-          <a:p>
-            <a:pPr lvl="1"/>
-            <a:r>
-              <a:rPr lang="en-US" altLang="ja-JP" dirty="0"/>
-              <a:t>and download Jama-1.0.3.jar</a:t>
+              <a:t>https://tms.riken.jp/en/research/software/sindo</a:t>
             </a:r>
           </a:p>
           <a:p>
@@ -4033,52 +4064,8 @@
             </a:pPr>
             <a:r>
               <a:rPr lang="en-US" altLang="ja-JP" dirty="0"/>
-              <a:t>Download sindo-4.0.tar.gz from our website</a:t>
-            </a:r>
-          </a:p>
-          <a:p>
-            <a:pPr lvl="1"/>
-            <a:r>
-              <a:rPr lang="en-US" altLang="ja-JP" dirty="0"/>
-              <a:t>http://</a:t>
-            </a:r>
-            <a:r>
-              <a:rPr lang="en-US" altLang="ja-JP" dirty="0" err="1"/>
-              <a:t>www.riken.jp</a:t>
-            </a:r>
-            <a:r>
-              <a:rPr lang="en-US" altLang="ja-JP" dirty="0"/>
-              <a:t>/TMS2012/</a:t>
-            </a:r>
-            <a:r>
-              <a:rPr lang="en-US" altLang="ja-JP" dirty="0" err="1"/>
-              <a:t>tms</a:t>
-            </a:r>
-            <a:r>
-              <a:rPr lang="en-US" altLang="ja-JP" dirty="0"/>
-              <a:t>/</a:t>
-            </a:r>
-            <a:r>
-              <a:rPr lang="en-US" altLang="ja-JP" dirty="0" err="1"/>
-              <a:t>en</a:t>
-            </a:r>
-            <a:r>
-              <a:rPr lang="en-US" altLang="ja-JP" dirty="0"/>
-              <a:t>/research/software/</a:t>
-            </a:r>
-            <a:r>
-              <a:rPr lang="en-US" altLang="ja-JP" dirty="0" err="1"/>
-              <a:t>sindo</a:t>
-            </a:r>
-            <a:r>
-              <a:rPr lang="en-US" altLang="ja-JP" dirty="0"/>
-              <a:t>/</a:t>
-            </a:r>
-            <a:r>
-              <a:rPr lang="en-US" altLang="ja-JP" dirty="0" err="1"/>
-              <a:t>index.html</a:t>
-            </a:r>
-            <a:endParaRPr lang="en-US" altLang="ja-JP" dirty="0"/>
+              <a:t>Unzip (double click ) the file, and find “sindovars.sh” in the top directory,</a:t>
+            </a:r>
           </a:p>
           <a:p>
             <a:pPr marL="342900" indent="-342900">
@@ -4092,10 +4079,7 @@
               <a:buFont typeface="+mj-lt"/>
               <a:buAutoNum type="arabicPeriod"/>
             </a:pPr>
-            <a:r>
-              <a:rPr lang="en-US" altLang="ja-JP" dirty="0"/>
-              <a:t>Extract the tar ball and go to sindo-4.0/jar,</a:t>
-            </a:r>
+            <a:endParaRPr lang="en-US" altLang="ja-JP" dirty="0"/>
           </a:p>
           <a:p>
             <a:pPr marL="342900" indent="-342900">
@@ -4105,6 +4089,24 @@
             <a:endParaRPr lang="en-US" altLang="ja-JP" dirty="0"/>
           </a:p>
           <a:p>
+            <a:pPr marL="358775" lvl="1"/>
+            <a:endParaRPr lang="en-US" altLang="ja-JP" dirty="0"/>
+          </a:p>
+          <a:p>
+            <a:pPr marL="358775" lvl="1"/>
+            <a:r>
+              <a:rPr lang="en-US" altLang="ja-JP" dirty="0"/>
+              <a:t>Edit “sindovars.sh” and set “/path/to/sindo” to the name of install directory.</a:t>
+            </a:r>
+          </a:p>
+          <a:p>
+            <a:pPr marL="358775" lvl="1"/>
+            <a:r>
+              <a:rPr lang="en-US" altLang="ja-JP" dirty="0"/>
+              <a:t> </a:t>
+            </a:r>
+          </a:p>
+          <a:p>
             <a:pPr marL="342900" indent="-342900">
               <a:buFont typeface="+mj-lt"/>
               <a:buAutoNum type="arabicPeriod"/>
@@ -4126,20 +4128,42 @@
             <a:endParaRPr lang="en-US" altLang="ja-JP" dirty="0"/>
           </a:p>
           <a:p>
-            <a:pPr lvl="1"/>
+            <a:pPr marL="342900" indent="-342900">
+              <a:buFont typeface="+mj-lt"/>
+              <a:buAutoNum type="arabicPeriod"/>
+            </a:pPr>
+            <a:endParaRPr lang="en-US" altLang="ja-JP" dirty="0"/>
+          </a:p>
+          <a:p>
+            <a:pPr marL="342900" indent="-342900">
+              <a:buFont typeface="+mj-lt"/>
+              <a:buAutoNum type="arabicPeriod"/>
+            </a:pPr>
+            <a:endParaRPr lang="en-US" altLang="ja-JP" dirty="0"/>
+          </a:p>
+          <a:p>
+            <a:pPr marL="342900" indent="-342900">
+              <a:buFont typeface="+mj-lt"/>
+              <a:buAutoNum type="arabicPeriod"/>
+            </a:pPr>
             <a:r>
               <a:rPr lang="en-US" altLang="ja-JP" dirty="0"/>
-              <a:t>Then, copy the jar file of JAMA.</a:t>
-            </a:r>
-          </a:p>
-        </p:txBody>
-      </p:sp>
-      <p:sp>
-        <p:nvSpPr>
-          <p:cNvPr id="10" name="テキスト ボックス 9">
+              <a:t>O</a:t>
+            </a:r>
+            <a:r>
+              <a:rPr lang="en-US" altLang="ja-JP"/>
+              <a:t>pen a terminal, source “sindovars.sh”, and then invoke RunMakePES:</a:t>
+            </a:r>
+            <a:endParaRPr lang="en-US" altLang="ja-JP" dirty="0"/>
+          </a:p>
+        </p:txBody>
+      </p:sp>
+      <p:sp>
+        <p:nvSpPr>
+          <p:cNvPr id="8" name="テキスト ボックス 13">
             <a:extLst>
               <a:ext uri="{FF2B5EF4-FFF2-40B4-BE49-F238E27FC236}">
-                <a16:creationId xmlns:a16="http://schemas.microsoft.com/office/drawing/2014/main" id="{97BBC431-7BA2-A14B-A49B-98E5FAC816C3}"/>
+                <a16:creationId xmlns:a16="http://schemas.microsoft.com/office/drawing/2014/main" id="{76084667-EF90-1D4E-81CB-991F92E2431E}"/>
               </a:ext>
             </a:extLst>
           </p:cNvPr>
@@ -4148,8 +4172,8 @@
         </p:nvSpPr>
         <p:spPr>
           <a:xfrm>
-            <a:off x="1587783" y="6258613"/>
-            <a:ext cx="4130393" cy="276999"/>
+            <a:off x="1204223" y="3722878"/>
+            <a:ext cx="6692858" cy="1200329"/>
           </a:xfrm>
           <a:prstGeom prst="rect">
             <a:avLst/>
@@ -4162,7 +4186,7 @@
           </a:ln>
         </p:spPr>
         <p:txBody>
-          <a:bodyPr wrap="square" rtlCol="0">
+          <a:bodyPr wrap="none" rtlCol="0">
             <a:spAutoFit/>
           </a:bodyPr>
           <a:lstStyle/>
@@ -4173,33 +4197,80 @@
                 <a:ea typeface="Courier" charset="0"/>
                 <a:cs typeface="Courier" charset="0"/>
               </a:rPr>
-              <a:t>&gt; </a:t>
-            </a:r>
-            <a:r>
-              <a:rPr lang="en-US" altLang="ja-JP" sz="1200" dirty="0" err="1">
-                <a:latin typeface="Courier" charset="0"/>
-                <a:ea typeface="Courier" charset="0"/>
-                <a:cs typeface="Courier" charset="0"/>
-              </a:rPr>
-              <a:t>cp</a:t>
-            </a:r>
+              <a:t>#!/bin/bash</a:t>
+            </a:r>
+          </a:p>
+          <a:p>
+            <a:endParaRPr lang="en-US" altLang="ja-JP" sz="1200" dirty="0">
+              <a:latin typeface="Courier" charset="0"/>
+              <a:ea typeface="Courier" charset="0"/>
+              <a:cs typeface="Courier" charset="0"/>
+            </a:endParaRPr>
+          </a:p>
+          <a:p>
             <a:r>
               <a:rPr lang="en-US" altLang="ja-JP" sz="1200" dirty="0">
                 <a:latin typeface="Courier" charset="0"/>
                 <a:ea typeface="Courier" charset="0"/>
                 <a:cs typeface="Courier" charset="0"/>
               </a:rPr>
-              <a:t> Jama-1.0.3.jar ./</a:t>
-            </a:r>
-          </a:p>
-        </p:txBody>
-      </p:sp>
-      <p:sp>
-        <p:nvSpPr>
-          <p:cNvPr id="12" name="テキスト ボックス 11">
+              <a:t>export sindo_dir=/</a:t>
+            </a:r>
+            <a:r>
+              <a:rPr lang="en-US" altLang="ja-JP" sz="1200" dirty="0">
+                <a:solidFill>
+                  <a:srgbClr val="FF0000"/>
+                </a:solidFill>
+                <a:latin typeface="Courier" charset="0"/>
+                <a:ea typeface="Courier" charset="0"/>
+                <a:cs typeface="Courier" charset="0"/>
+              </a:rPr>
+              <a:t>path/to/sindo</a:t>
+            </a:r>
+          </a:p>
+          <a:p>
+            <a:r>
+              <a:rPr lang="en-US" altLang="ja-JP" sz="1200" dirty="0">
+                <a:latin typeface="Courier" charset="0"/>
+                <a:ea typeface="Courier" charset="0"/>
+                <a:cs typeface="Courier" charset="0"/>
+              </a:rPr>
+              <a:t>export CLASSPATH=${CLASSPATH}:$sindo_dir/JSindo/jar/JSindo-4.0_fat.jar</a:t>
+            </a:r>
+          </a:p>
+          <a:p>
+            <a:r>
+              <a:rPr lang="en-US" altLang="ja-JP" sz="1200" dirty="0">
+                <a:latin typeface="Courier" charset="0"/>
+                <a:ea typeface="Courier" charset="0"/>
+                <a:cs typeface="Courier" charset="0"/>
+              </a:rPr>
+              <a:t>export PATH=$PATH:$sindo_dir/script:$sindo_dir/FSindo/bin</a:t>
+            </a:r>
+          </a:p>
+          <a:p>
+            <a:r>
+              <a:rPr lang="en-US" altLang="ja-JP" sz="1200" dirty="0">
+                <a:latin typeface="Courier" charset="0"/>
+                <a:ea typeface="Courier" charset="0"/>
+                <a:cs typeface="Courier" charset="0"/>
+              </a:rPr>
+              <a:t>export SINDO_RSH=ssh</a:t>
+            </a:r>
+            <a:endParaRPr kumimoji="1" lang="ja-JP" altLang="en-US" sz="1200" dirty="0">
+              <a:latin typeface="Courier" charset="0"/>
+              <a:ea typeface="Courier" charset="0"/>
+              <a:cs typeface="Courier" charset="0"/>
+            </a:endParaRPr>
+          </a:p>
+        </p:txBody>
+      </p:sp>
+      <p:sp>
+        <p:nvSpPr>
+          <p:cNvPr id="12" name="テキスト ボックス 13">
             <a:extLst>
               <a:ext uri="{FF2B5EF4-FFF2-40B4-BE49-F238E27FC236}">
-                <a16:creationId xmlns:a16="http://schemas.microsoft.com/office/drawing/2014/main" id="{83C16722-01F2-F541-B69C-41114815D699}"/>
+                <a16:creationId xmlns:a16="http://schemas.microsoft.com/office/drawing/2014/main" id="{67F4D80C-795C-984A-B35D-E86E58E7DF21}"/>
               </a:ext>
             </a:extLst>
           </p:cNvPr>
@@ -4208,87 +4279,8 @@
         </p:nvSpPr>
         <p:spPr>
           <a:xfrm>
-            <a:off x="1113782" y="306543"/>
-            <a:ext cx="7244406" cy="923330"/>
-          </a:xfrm>
-          <a:prstGeom prst="rect">
-            <a:avLst/>
-          </a:prstGeom>
-          <a:noFill/>
-          <a:ln>
-            <a:solidFill>
-              <a:schemeClr val="accent1"/>
-            </a:solidFill>
-          </a:ln>
-        </p:spPr>
-        <p:txBody>
-          <a:bodyPr wrap="square" rtlCol="0">
-            <a:spAutoFit/>
-          </a:bodyPr>
-          <a:lstStyle/>
-          <a:p>
-            <a:r>
-              <a:rPr kumimoji="1" lang="en-US" altLang="ja-JP" dirty="0"/>
-              <a:t>Note:</a:t>
-            </a:r>
-          </a:p>
-          <a:p>
-            <a:r>
-              <a:rPr lang="en-US" altLang="ja-JP" dirty="0" err="1"/>
-              <a:t>MakePES</a:t>
-            </a:r>
-            <a:r>
-              <a:rPr lang="en-US" altLang="ja-JP" dirty="0"/>
-              <a:t> is included in </a:t>
-            </a:r>
-            <a:r>
-              <a:rPr lang="en-US" altLang="ja-JP" dirty="0" err="1"/>
-              <a:t>JSindo</a:t>
-            </a:r>
-            <a:r>
-              <a:rPr lang="en-US" altLang="ja-JP" dirty="0"/>
-              <a:t>. So, you can go to step 5 if </a:t>
-            </a:r>
-            <a:r>
-              <a:rPr kumimoji="1" lang="en-US" altLang="ja-JP" dirty="0"/>
-              <a:t>you have already </a:t>
-            </a:r>
-            <a:r>
-              <a:rPr lang="en-US" altLang="ja-JP" dirty="0"/>
-              <a:t>set up</a:t>
-            </a:r>
-            <a:r>
-              <a:rPr kumimoji="1" lang="en-US" altLang="ja-JP" dirty="0"/>
-              <a:t> </a:t>
-            </a:r>
-            <a:r>
-              <a:rPr kumimoji="1" lang="en-US" altLang="ja-JP" dirty="0" err="1"/>
-              <a:t>JSindo</a:t>
-            </a:r>
-            <a:r>
-              <a:rPr kumimoji="1" lang="en-US" altLang="ja-JP" dirty="0"/>
-              <a:t>. </a:t>
-            </a:r>
-            <a:endParaRPr kumimoji="1" lang="ja-JP" altLang="en-US"/>
-          </a:p>
-        </p:txBody>
-      </p:sp>
-      <p:sp>
-        <p:nvSpPr>
-          <p:cNvPr id="7" name="テキスト ボックス 6">
-            <a:extLst>
-              <a:ext uri="{FF2B5EF4-FFF2-40B4-BE49-F238E27FC236}">
-                <a16:creationId xmlns:a16="http://schemas.microsoft.com/office/drawing/2014/main" id="{7D5BC78E-F266-F64C-9184-313751B00862}"/>
-              </a:ext>
-            </a:extLst>
-          </p:cNvPr>
-          <p:cNvSpPr txBox="1"/>
-          <p:nvPr/>
-        </p:nvSpPr>
-        <p:spPr>
-          <a:xfrm>
-            <a:off x="1591637" y="4891892"/>
-            <a:ext cx="4109075" cy="830997"/>
+            <a:off x="1204223" y="2452733"/>
+            <a:ext cx="6135013" cy="646331"/>
           </a:xfrm>
           <a:prstGeom prst="rect">
             <a:avLst/>
@@ -4301,65 +4293,152 @@
           </a:ln>
         </p:spPr>
         <p:txBody>
-          <a:bodyPr wrap="square" rtlCol="0">
+          <a:bodyPr wrap="none" rtlCol="0">
             <a:spAutoFit/>
           </a:bodyPr>
           <a:lstStyle/>
           <a:p>
+            <a:r>
+              <a:rPr kumimoji="1" lang="en-US" altLang="ja-JP" sz="1200" dirty="0">
+                <a:latin typeface="Courier" charset="0"/>
+                <a:ea typeface="Courier" charset="0"/>
+                <a:cs typeface="Courier" charset="0"/>
+              </a:rPr>
+              <a:t>&gt; cd </a:t>
+            </a:r>
             <a:r>
               <a:rPr lang="en-US" altLang="ja-JP" sz="1200" dirty="0">
                 <a:latin typeface="Courier" charset="0"/>
                 <a:ea typeface="Courier" charset="0"/>
                 <a:cs typeface="Courier" charset="0"/>
               </a:rPr>
-              <a:t>&gt; tar –</a:t>
-            </a:r>
-            <a:r>
-              <a:rPr lang="en-US" altLang="ja-JP" sz="1200" dirty="0" err="1">
+              <a:t>sindo-4.0_xxxx</a:t>
+            </a:r>
+          </a:p>
+          <a:p>
+            <a:r>
+              <a:rPr kumimoji="1" lang="en-US" altLang="ja-JP" sz="1200" dirty="0">
                 <a:latin typeface="Courier" charset="0"/>
                 <a:ea typeface="Courier" charset="0"/>
                 <a:cs typeface="Courier" charset="0"/>
               </a:rPr>
-              <a:t>zxvf</a:t>
-            </a:r>
+              <a:t>&gt; ls </a:t>
+            </a:r>
+          </a:p>
+          <a:p>
             <a:r>
               <a:rPr lang="en-US" altLang="ja-JP" sz="1200" dirty="0">
                 <a:latin typeface="Courier" charset="0"/>
                 <a:ea typeface="Courier" charset="0"/>
                 <a:cs typeface="Courier" charset="0"/>
               </a:rPr>
-              <a:t> sindo-4.0.tar.gz </a:t>
-            </a:r>
-          </a:p>
-          <a:p>
+              <a:t>FSindo/   JSindo/   LICENSE   README.md   script/   </a:t>
+            </a:r>
+            <a:r>
+              <a:rPr lang="en-US" altLang="ja-JP" sz="1200" dirty="0">
+                <a:solidFill>
+                  <a:srgbClr val="FF0000"/>
+                </a:solidFill>
+                <a:latin typeface="Courier" charset="0"/>
+                <a:ea typeface="Courier" charset="0"/>
+                <a:cs typeface="Courier" charset="0"/>
+              </a:rPr>
+              <a:t>sindovars.sh</a:t>
+            </a:r>
+            <a:endParaRPr kumimoji="1" lang="ja-JP" altLang="en-US" sz="1200" dirty="0">
+              <a:solidFill>
+                <a:srgbClr val="FF0000"/>
+              </a:solidFill>
+              <a:latin typeface="Courier" charset="0"/>
+              <a:ea typeface="Courier" charset="0"/>
+              <a:cs typeface="Courier" charset="0"/>
+            </a:endParaRPr>
+          </a:p>
+        </p:txBody>
+      </p:sp>
+      <p:sp>
+        <p:nvSpPr>
+          <p:cNvPr id="15" name="テキスト ボックス 13">
+            <a:extLst>
+              <a:ext uri="{FF2B5EF4-FFF2-40B4-BE49-F238E27FC236}">
+                <a16:creationId xmlns:a16="http://schemas.microsoft.com/office/drawing/2014/main" id="{30628366-A132-BA4B-85F1-F9983BCB82A5}"/>
+              </a:ext>
+            </a:extLst>
+          </p:cNvPr>
+          <p:cNvSpPr txBox="1"/>
+          <p:nvPr/>
+        </p:nvSpPr>
+        <p:spPr>
+          <a:xfrm>
+            <a:off x="1204223" y="5641181"/>
+            <a:ext cx="2880917" cy="461665"/>
+          </a:xfrm>
+          <a:prstGeom prst="rect">
+            <a:avLst/>
+          </a:prstGeom>
+          <a:noFill/>
+          <a:ln>
+            <a:solidFill>
+              <a:srgbClr val="00B050"/>
+            </a:solidFill>
+          </a:ln>
+        </p:spPr>
+        <p:txBody>
+          <a:bodyPr wrap="none" rtlCol="0">
+            <a:spAutoFit/>
+          </a:bodyPr>
+          <a:lstStyle/>
+          <a:p>
+            <a:r>
+              <a:rPr kumimoji="1" lang="en-US" altLang="ja-JP" sz="1200" dirty="0">
+                <a:latin typeface="Courier" charset="0"/>
+                <a:ea typeface="Courier" charset="0"/>
+                <a:cs typeface="Courier" charset="0"/>
+              </a:rPr>
+              <a:t>. /</a:t>
+            </a:r>
+            <a:r>
+              <a:rPr kumimoji="1" lang="en-US" altLang="ja-JP" sz="1200" dirty="0">
+                <a:solidFill>
+                  <a:srgbClr val="FF0000"/>
+                </a:solidFill>
+                <a:latin typeface="Courier" charset="0"/>
+                <a:ea typeface="Courier" charset="0"/>
+                <a:cs typeface="Courier" charset="0"/>
+              </a:rPr>
+              <a:t>path/to/sindo</a:t>
+            </a:r>
+            <a:r>
+              <a:rPr kumimoji="1" lang="en-US" altLang="ja-JP" sz="1200" dirty="0">
+                <a:latin typeface="Courier" charset="0"/>
+                <a:ea typeface="Courier" charset="0"/>
+                <a:cs typeface="Courier" charset="0"/>
+              </a:rPr>
+              <a:t>/sindovars.sh</a:t>
+            </a:r>
+          </a:p>
+          <a:p>
+            <a:r>
+              <a:rPr kumimoji="1" lang="en-US" altLang="ja-JP" sz="1200" dirty="0">
+                <a:latin typeface="Courier" charset="0"/>
+                <a:ea typeface="Courier" charset="0"/>
+                <a:cs typeface="Courier" charset="0"/>
+              </a:rPr>
+              <a:t>java </a:t>
+            </a:r>
             <a:r>
               <a:rPr lang="en-US" altLang="ja-JP" sz="1200" dirty="0">
                 <a:latin typeface="Courier" charset="0"/>
                 <a:ea typeface="Courier" charset="0"/>
                 <a:cs typeface="Courier" charset="0"/>
               </a:rPr>
-              <a:t>&gt; cd sindo-4.0/jar</a:t>
-            </a:r>
-          </a:p>
-          <a:p>
-            <a:r>
-              <a:rPr lang="en-US" altLang="ja-JP" sz="1200" dirty="0">
-                <a:latin typeface="Courier" charset="0"/>
-                <a:ea typeface="Courier" charset="0"/>
-                <a:cs typeface="Courier" charset="0"/>
-              </a:rPr>
-              <a:t>&gt; ls</a:t>
-            </a:r>
-          </a:p>
-          <a:p>
-            <a:r>
-              <a:rPr lang="en-US" altLang="ja-JP" sz="1200" dirty="0">
-                <a:latin typeface="Courier" charset="0"/>
-                <a:ea typeface="Courier" charset="0"/>
-                <a:cs typeface="Courier" charset="0"/>
-              </a:rPr>
-              <a:t>JSindo-4.0.jar</a:t>
-            </a:r>
+              <a:t>RunMakePES -h</a:t>
+            </a:r>
+            <a:endParaRPr kumimoji="1" lang="ja-JP" altLang="en-US" sz="1200" dirty="0">
+              <a:latin typeface="Courier" charset="0"/>
+              <a:ea typeface="Courier" charset="0"/>
+              <a:cs typeface="Courier" charset="0"/>
+            </a:endParaRPr>
           </a:p>
         </p:txBody>
       </p:sp>
@@ -4395,10 +4474,10 @@
       </p:grpSpPr>
       <p:sp>
         <p:nvSpPr>
-          <p:cNvPr id="3" name="スライド番号プレースホルダー 2">
+          <p:cNvPr id="2" name="スライド番号プレースホルダー 1">
             <a:extLst>
               <a:ext uri="{FF2B5EF4-FFF2-40B4-BE49-F238E27FC236}">
-                <a16:creationId xmlns:a16="http://schemas.microsoft.com/office/drawing/2014/main" id="{3124C8F4-6819-6945-B5A0-D68D9534B7E4}"/>
+                <a16:creationId xmlns:a16="http://schemas.microsoft.com/office/drawing/2014/main" id="{71B9E682-916D-5842-B80B-D8A2B885516C}"/>
               </a:ext>
             </a:extLst>
           </p:cNvPr>
@@ -4424,10 +4503,10 @@
       </p:sp>
       <p:sp>
         <p:nvSpPr>
-          <p:cNvPr id="4" name="テキスト ボックス 3">
+          <p:cNvPr id="8" name="テキスト ボックス 7">
             <a:extLst>
               <a:ext uri="{FF2B5EF4-FFF2-40B4-BE49-F238E27FC236}">
-                <a16:creationId xmlns:a16="http://schemas.microsoft.com/office/drawing/2014/main" id="{11585F11-66EC-6249-AE01-494897FF3B1F}"/>
+                <a16:creationId xmlns:a16="http://schemas.microsoft.com/office/drawing/2014/main" id="{CC431FD3-0273-1445-946B-B4EEB90C0ABC}"/>
               </a:ext>
             </a:extLst>
           </p:cNvPr>
@@ -4436,7 +4515,321 @@
         </p:nvSpPr>
         <p:spPr>
           <a:xfrm>
-            <a:off x="1557964" y="1972120"/>
+            <a:off x="1173064" y="1358024"/>
+            <a:ext cx="5155322" cy="369332"/>
+          </a:xfrm>
+          <a:prstGeom prst="rect">
+            <a:avLst/>
+          </a:prstGeom>
+          <a:noFill/>
+        </p:spPr>
+        <p:txBody>
+          <a:bodyPr wrap="none" rtlCol="0">
+            <a:spAutoFit/>
+          </a:bodyPr>
+          <a:lstStyle/>
+          <a:p>
+            <a:r>
+              <a:rPr kumimoji="1" lang="en-US" altLang="ja-JP" dirty="0"/>
+              <a:t>It is useful to source “sindovars.sh” in your ~/.</a:t>
+            </a:r>
+            <a:r>
+              <a:rPr kumimoji="1" lang="en-US" altLang="ja-JP" dirty="0" err="1"/>
+              <a:t>bashrc</a:t>
+            </a:r>
+            <a:r>
+              <a:rPr kumimoji="1" lang="en-US" altLang="ja-JP" dirty="0"/>
+              <a:t>,</a:t>
+            </a:r>
+            <a:endParaRPr kumimoji="1" lang="ja-JP" altLang="en-US" dirty="0"/>
+          </a:p>
+        </p:txBody>
+      </p:sp>
+      <p:sp>
+        <p:nvSpPr>
+          <p:cNvPr id="9" name="テキスト ボックス 8">
+            <a:extLst>
+              <a:ext uri="{FF2B5EF4-FFF2-40B4-BE49-F238E27FC236}">
+                <a16:creationId xmlns:a16="http://schemas.microsoft.com/office/drawing/2014/main" id="{9E1643E7-A1E5-C044-9B66-50B0149C65C2}"/>
+              </a:ext>
+            </a:extLst>
+          </p:cNvPr>
+          <p:cNvSpPr txBox="1"/>
+          <p:nvPr/>
+        </p:nvSpPr>
+        <p:spPr>
+          <a:xfrm>
+            <a:off x="827315" y="1916880"/>
+            <a:ext cx="7696754" cy="4524315"/>
+          </a:xfrm>
+          <a:prstGeom prst="rect">
+            <a:avLst/>
+          </a:prstGeom>
+          <a:noFill/>
+        </p:spPr>
+        <p:txBody>
+          <a:bodyPr wrap="square" rtlCol="0">
+            <a:spAutoFit/>
+          </a:bodyPr>
+          <a:lstStyle/>
+          <a:p>
+            <a:r>
+              <a:rPr lang="en-US" altLang="ja-JP" dirty="0"/>
+              <a:t>4. Configuration for Gaussian</a:t>
+            </a:r>
+          </a:p>
+          <a:p>
+            <a:pPr marL="342900" indent="-342900">
+              <a:buFont typeface="+mj-lt"/>
+              <a:buAutoNum type="arabicPeriod" startAt="6"/>
+            </a:pPr>
+            <a:endParaRPr lang="en-US" altLang="ja-JP" dirty="0"/>
+          </a:p>
+          <a:p>
+            <a:pPr lvl="1"/>
+            <a:endParaRPr lang="en-US" altLang="ja-JP" dirty="0"/>
+          </a:p>
+          <a:p>
+            <a:pPr lvl="1"/>
+            <a:endParaRPr lang="en-US" altLang="ja-JP" dirty="0"/>
+          </a:p>
+          <a:p>
+            <a:pPr lvl="1"/>
+            <a:endParaRPr lang="en-US" altLang="ja-JP" dirty="0"/>
+          </a:p>
+          <a:p>
+            <a:pPr lvl="1"/>
+            <a:r>
+              <a:rPr lang="en-US" altLang="ja-JP" dirty="0"/>
+              <a:t>Proceed to “script”, execute a configure script, and follow the instruction,</a:t>
+            </a:r>
+          </a:p>
+          <a:p>
+            <a:pPr lvl="1"/>
+            <a:endParaRPr lang="en-US" altLang="ja-JP" dirty="0"/>
+          </a:p>
+          <a:p>
+            <a:pPr lvl="1"/>
+            <a:endParaRPr lang="en-US" altLang="ja-JP" dirty="0"/>
+          </a:p>
+          <a:p>
+            <a:pPr lvl="1"/>
+            <a:endParaRPr lang="en-US" altLang="ja-JP" dirty="0"/>
+          </a:p>
+          <a:p>
+            <a:pPr lvl="1"/>
+            <a:r>
+              <a:rPr lang="en-US" altLang="ja-JP" dirty="0"/>
+              <a:t>You will be asked to enter a directory where Gaussian is installed, the version of Gaussian, and a local scratch directory. The script creates </a:t>
+            </a:r>
+            <a:r>
+              <a:rPr lang="en-US" altLang="ja-JP" dirty="0" err="1"/>
+              <a:t>runGaussian.sh</a:t>
+            </a:r>
+            <a:r>
+              <a:rPr lang="en-US" altLang="ja-JP" dirty="0"/>
+              <a:t> in the same directory. </a:t>
+            </a:r>
+          </a:p>
+          <a:p>
+            <a:pPr lvl="1"/>
+            <a:endParaRPr lang="en-US" altLang="ja-JP" dirty="0"/>
+          </a:p>
+          <a:p>
+            <a:pPr lvl="1"/>
+            <a:r>
+              <a:rPr lang="en-US" altLang="ja-JP" dirty="0"/>
+              <a:t>Note that “sindovars.sh” sets a path to this directory:</a:t>
+            </a:r>
+          </a:p>
+          <a:p>
+            <a:pPr lvl="1"/>
+            <a:endParaRPr lang="en-US" altLang="ja-JP" dirty="0"/>
+          </a:p>
+          <a:p>
+            <a:pPr lvl="1"/>
+            <a:endParaRPr lang="en-US" altLang="ja-JP" dirty="0"/>
+          </a:p>
+        </p:txBody>
+      </p:sp>
+      <p:sp>
+        <p:nvSpPr>
+          <p:cNvPr id="10" name="テキスト ボックス 9">
+            <a:extLst>
+              <a:ext uri="{FF2B5EF4-FFF2-40B4-BE49-F238E27FC236}">
+                <a16:creationId xmlns:a16="http://schemas.microsoft.com/office/drawing/2014/main" id="{6C7DF210-EA89-834C-AF5D-BFE987AC3D34}"/>
+              </a:ext>
+            </a:extLst>
+          </p:cNvPr>
+          <p:cNvSpPr txBox="1"/>
+          <p:nvPr/>
+        </p:nvSpPr>
+        <p:spPr>
+          <a:xfrm>
+            <a:off x="1557964" y="3764124"/>
+            <a:ext cx="2601994" cy="461665"/>
+          </a:xfrm>
+          <a:prstGeom prst="rect">
+            <a:avLst/>
+          </a:prstGeom>
+          <a:noFill/>
+          <a:ln>
+            <a:solidFill>
+              <a:srgbClr val="00B050"/>
+            </a:solidFill>
+          </a:ln>
+        </p:spPr>
+        <p:txBody>
+          <a:bodyPr wrap="none" rtlCol="0">
+            <a:spAutoFit/>
+          </a:bodyPr>
+          <a:lstStyle/>
+          <a:p>
+            <a:r>
+              <a:rPr lang="en-US" altLang="ja-JP" sz="1200" dirty="0">
+                <a:latin typeface="Courier" charset="0"/>
+                <a:ea typeface="Courier" charset="0"/>
+                <a:cs typeface="Courier" charset="0"/>
+              </a:rPr>
+              <a:t>&gt; cd sindo-4.0_xxxx/script</a:t>
+            </a:r>
+          </a:p>
+          <a:p>
+            <a:r>
+              <a:rPr kumimoji="1" lang="en-US" altLang="ja-JP" sz="1200" dirty="0">
+                <a:latin typeface="Courier" charset="0"/>
+                <a:ea typeface="Courier" charset="0"/>
+                <a:cs typeface="Courier" charset="0"/>
+              </a:rPr>
+              <a:t>&gt; ./configure</a:t>
+            </a:r>
+          </a:p>
+        </p:txBody>
+      </p:sp>
+      <p:sp>
+        <p:nvSpPr>
+          <p:cNvPr id="11" name="テキスト ボックス 10">
+            <a:extLst>
+              <a:ext uri="{FF2B5EF4-FFF2-40B4-BE49-F238E27FC236}">
+                <a16:creationId xmlns:a16="http://schemas.microsoft.com/office/drawing/2014/main" id="{F50E1DA0-C9B0-BB42-990C-C0E61BD146CA}"/>
+              </a:ext>
+            </a:extLst>
+          </p:cNvPr>
+          <p:cNvSpPr txBox="1"/>
+          <p:nvPr/>
+        </p:nvSpPr>
+        <p:spPr>
+          <a:xfrm>
+            <a:off x="1557964" y="5918589"/>
+            <a:ext cx="5484194" cy="276999"/>
+          </a:xfrm>
+          <a:prstGeom prst="rect">
+            <a:avLst/>
+          </a:prstGeom>
+          <a:noFill/>
+          <a:ln>
+            <a:solidFill>
+              <a:srgbClr val="00B050"/>
+            </a:solidFill>
+          </a:ln>
+        </p:spPr>
+        <p:txBody>
+          <a:bodyPr wrap="none" rtlCol="0">
+            <a:spAutoFit/>
+          </a:bodyPr>
+          <a:lstStyle/>
+          <a:p>
+            <a:r>
+              <a:rPr lang="en-US" altLang="ja-JP" sz="1200" dirty="0">
+                <a:latin typeface="Courier" charset="0"/>
+                <a:ea typeface="Courier" charset="0"/>
+                <a:cs typeface="Courier" charset="0"/>
+              </a:rPr>
+              <a:t>export PATH=$PATH:</a:t>
+            </a:r>
+            <a:r>
+              <a:rPr lang="en-US" altLang="ja-JP" sz="1200" dirty="0">
+                <a:solidFill>
+                  <a:srgbClr val="FF0000"/>
+                </a:solidFill>
+                <a:latin typeface="Courier" charset="0"/>
+                <a:ea typeface="Courier" charset="0"/>
+                <a:cs typeface="Courier" charset="0"/>
+              </a:rPr>
+              <a:t>$sindo_dir/script</a:t>
+            </a:r>
+            <a:r>
+              <a:rPr lang="en-US" altLang="ja-JP" sz="1200" dirty="0">
+                <a:latin typeface="Courier" charset="0"/>
+                <a:ea typeface="Courier" charset="0"/>
+                <a:cs typeface="Courier" charset="0"/>
+              </a:rPr>
+              <a:t>:$sindo_dir/FSindo/bin</a:t>
+            </a:r>
+            <a:endParaRPr kumimoji="1" lang="en-US" altLang="ja-JP" sz="1200" dirty="0">
+              <a:latin typeface="Courier" charset="0"/>
+              <a:ea typeface="Courier" charset="0"/>
+              <a:cs typeface="Courier" charset="0"/>
+            </a:endParaRPr>
+          </a:p>
+        </p:txBody>
+      </p:sp>
+      <p:sp>
+        <p:nvSpPr>
+          <p:cNvPr id="12" name="テキスト ボックス 11">
+            <a:extLst>
+              <a:ext uri="{FF2B5EF4-FFF2-40B4-BE49-F238E27FC236}">
+                <a16:creationId xmlns:a16="http://schemas.microsoft.com/office/drawing/2014/main" id="{95FC9238-D4AC-0141-A6B7-33644E736884}"/>
+              </a:ext>
+            </a:extLst>
+          </p:cNvPr>
+          <p:cNvSpPr txBox="1"/>
+          <p:nvPr/>
+        </p:nvSpPr>
+        <p:spPr>
+          <a:xfrm>
+            <a:off x="1271584" y="2462946"/>
+            <a:ext cx="6972304" cy="646331"/>
+          </a:xfrm>
+          <a:prstGeom prst="rect">
+            <a:avLst/>
+          </a:prstGeom>
+          <a:noFill/>
+          <a:ln>
+            <a:solidFill>
+              <a:schemeClr val="accent1"/>
+            </a:solidFill>
+          </a:ln>
+        </p:spPr>
+        <p:txBody>
+          <a:bodyPr wrap="square" rtlCol="0">
+            <a:spAutoFit/>
+          </a:bodyPr>
+          <a:lstStyle/>
+          <a:p>
+            <a:r>
+              <a:rPr lang="en-US" altLang="ja-JP" dirty="0"/>
+              <a:t>Note: You can skip this step if you don’t plan to use Gaussian, or if you run Gaussian by yourself.</a:t>
+            </a:r>
+            <a:endParaRPr kumimoji="1" lang="ja-JP" altLang="en-US"/>
+          </a:p>
+        </p:txBody>
+      </p:sp>
+      <p:sp>
+        <p:nvSpPr>
+          <p:cNvPr id="13" name="テキスト ボックス 12">
+            <a:extLst>
+              <a:ext uri="{FF2B5EF4-FFF2-40B4-BE49-F238E27FC236}">
+                <a16:creationId xmlns:a16="http://schemas.microsoft.com/office/drawing/2014/main" id="{36B93C3B-B85F-B94D-A89C-E56025C09DDC}"/>
+              </a:ext>
+            </a:extLst>
+          </p:cNvPr>
+          <p:cNvSpPr txBox="1"/>
+          <p:nvPr/>
+        </p:nvSpPr>
+        <p:spPr>
+          <a:xfrm>
+            <a:off x="1246465" y="1022754"/>
             <a:ext cx="5670142" cy="276999"/>
           </a:xfrm>
           <a:prstGeom prst="rect">
@@ -4505,10 +4898,10 @@
       </p:sp>
       <p:sp>
         <p:nvSpPr>
-          <p:cNvPr id="5" name="テキスト ボックス 4">
+          <p:cNvPr id="14" name="テキスト ボックス 13">
             <a:extLst>
               <a:ext uri="{FF2B5EF4-FFF2-40B4-BE49-F238E27FC236}">
-                <a16:creationId xmlns:a16="http://schemas.microsoft.com/office/drawing/2014/main" id="{E23AB5E9-82B7-344B-9834-09206DC88786}"/>
+                <a16:creationId xmlns:a16="http://schemas.microsoft.com/office/drawing/2014/main" id="{C81BF119-F32F-6044-8D4D-83D51A57898C}"/>
               </a:ext>
             </a:extLst>
           </p:cNvPr>
@@ -4517,46 +4910,7 @@
         </p:nvSpPr>
         <p:spPr>
           <a:xfrm>
-            <a:off x="827314" y="439773"/>
-            <a:ext cx="3148619" cy="369332"/>
-          </a:xfrm>
-          <a:prstGeom prst="rect">
-            <a:avLst/>
-          </a:prstGeom>
-          <a:noFill/>
-        </p:spPr>
-        <p:txBody>
-          <a:bodyPr wrap="none" rtlCol="0">
-            <a:spAutoFit/>
-          </a:bodyPr>
-          <a:lstStyle/>
-          <a:p>
-            <a:pPr marL="342900" indent="-342900">
-              <a:buFont typeface="+mj-lt"/>
-              <a:buAutoNum type="arabicPeriod" startAt="5"/>
-            </a:pPr>
-            <a:r>
-              <a:rPr lang="en-US" altLang="ja-JP" dirty="0"/>
-              <a:t>Try the following command,</a:t>
-            </a:r>
-          </a:p>
-        </p:txBody>
-      </p:sp>
-      <p:sp>
-        <p:nvSpPr>
-          <p:cNvPr id="6" name="テキスト ボックス 5">
-            <a:extLst>
-              <a:ext uri="{FF2B5EF4-FFF2-40B4-BE49-F238E27FC236}">
-                <a16:creationId xmlns:a16="http://schemas.microsoft.com/office/drawing/2014/main" id="{2C51ACA4-BA84-2C49-9BA2-0CCD96CE8974}"/>
-              </a:ext>
-            </a:extLst>
-          </p:cNvPr>
-          <p:cNvSpPr txBox="1"/>
-          <p:nvPr/>
-        </p:nvSpPr>
-        <p:spPr>
-          <a:xfrm>
-            <a:off x="1161143" y="1515187"/>
+            <a:off x="1161143" y="565821"/>
             <a:ext cx="6416885" cy="369332"/>
           </a:xfrm>
           <a:prstGeom prst="rect">
@@ -4594,809 +4948,10 @@
           </a:p>
         </p:txBody>
       </p:sp>
-      <p:sp>
-        <p:nvSpPr>
-          <p:cNvPr id="7" name="テキスト ボックス 6">
-            <a:extLst>
-              <a:ext uri="{FF2B5EF4-FFF2-40B4-BE49-F238E27FC236}">
-                <a16:creationId xmlns:a16="http://schemas.microsoft.com/office/drawing/2014/main" id="{5FC1AFE4-2F05-D342-837E-9498BE54C3FE}"/>
-              </a:ext>
-            </a:extLst>
-          </p:cNvPr>
-          <p:cNvSpPr txBox="1"/>
-          <p:nvPr/>
-        </p:nvSpPr>
-        <p:spPr>
-          <a:xfrm>
-            <a:off x="1557964" y="875722"/>
-            <a:ext cx="4089581" cy="461665"/>
-          </a:xfrm>
-          <a:prstGeom prst="rect">
-            <a:avLst/>
-          </a:prstGeom>
-          <a:noFill/>
-          <a:ln>
-            <a:solidFill>
-              <a:srgbClr val="00B050"/>
-            </a:solidFill>
-          </a:ln>
-        </p:spPr>
-        <p:txBody>
-          <a:bodyPr wrap="none" rtlCol="0">
-            <a:spAutoFit/>
-          </a:bodyPr>
-          <a:lstStyle/>
-          <a:p>
-            <a:r>
-              <a:rPr lang="en-US" altLang="ja-JP" sz="1200" dirty="0">
-                <a:latin typeface="Courier" charset="0"/>
-                <a:ea typeface="Courier" charset="0"/>
-                <a:cs typeface="Courier" charset="0"/>
-              </a:rPr>
-              <a:t>&gt; export </a:t>
-            </a:r>
-            <a:r>
-              <a:rPr lang="en-US" altLang="ja-JP" sz="1200" dirty="0" err="1">
-                <a:latin typeface="Courier" charset="0"/>
-                <a:ea typeface="Courier" charset="0"/>
-                <a:cs typeface="Courier" charset="0"/>
-              </a:rPr>
-              <a:t>sindo_jar</a:t>
-            </a:r>
-            <a:r>
-              <a:rPr lang="en-US" altLang="ja-JP" sz="1200" dirty="0">
-                <a:latin typeface="Courier" charset="0"/>
-                <a:ea typeface="Courier" charset="0"/>
-                <a:cs typeface="Courier" charset="0"/>
-              </a:rPr>
-              <a:t>=/path/to/sindo-4.0/jar </a:t>
-            </a:r>
-          </a:p>
-          <a:p>
-            <a:r>
-              <a:rPr lang="en-US" altLang="ja-JP" sz="1200" dirty="0">
-                <a:latin typeface="Courier" charset="0"/>
-                <a:ea typeface="Courier" charset="0"/>
-                <a:cs typeface="Courier" charset="0"/>
-              </a:rPr>
-              <a:t>&gt; </a:t>
-            </a:r>
-            <a:r>
-              <a:rPr kumimoji="1" lang="en-US" altLang="ja-JP" sz="1200" dirty="0">
-                <a:latin typeface="Courier" charset="0"/>
-                <a:ea typeface="Courier" charset="0"/>
-                <a:cs typeface="Courier" charset="0"/>
-              </a:rPr>
-              <a:t>java –</a:t>
-            </a:r>
-            <a:r>
-              <a:rPr kumimoji="1" lang="en-US" altLang="ja-JP" sz="1200" dirty="0" err="1">
-                <a:latin typeface="Courier" charset="0"/>
-                <a:ea typeface="Courier" charset="0"/>
-                <a:cs typeface="Courier" charset="0"/>
-              </a:rPr>
-              <a:t>cp</a:t>
-            </a:r>
-            <a:r>
-              <a:rPr kumimoji="1" lang="en-US" altLang="ja-JP" sz="1200" dirty="0">
-                <a:latin typeface="Courier" charset="0"/>
-                <a:ea typeface="Courier" charset="0"/>
-                <a:cs typeface="Courier" charset="0"/>
-              </a:rPr>
-              <a:t> “$</a:t>
-            </a:r>
-            <a:r>
-              <a:rPr kumimoji="1" lang="en-US" altLang="ja-JP" sz="1200" dirty="0" err="1">
-                <a:latin typeface="Courier" charset="0"/>
-                <a:ea typeface="Courier" charset="0"/>
-                <a:cs typeface="Courier" charset="0"/>
-              </a:rPr>
-              <a:t>sindo_jar</a:t>
-            </a:r>
-            <a:r>
-              <a:rPr kumimoji="1" lang="en-US" altLang="ja-JP" sz="1200" dirty="0">
-                <a:latin typeface="Courier" charset="0"/>
-                <a:ea typeface="Courier" charset="0"/>
-                <a:cs typeface="Courier" charset="0"/>
-              </a:rPr>
-              <a:t>/*” </a:t>
-            </a:r>
-            <a:r>
-              <a:rPr kumimoji="1" lang="en-US" altLang="ja-JP" sz="1200" dirty="0" err="1">
-                <a:latin typeface="Courier" charset="0"/>
-                <a:ea typeface="Courier" charset="0"/>
-                <a:cs typeface="Courier" charset="0"/>
-              </a:rPr>
-              <a:t>RunMakePES</a:t>
-            </a:r>
-            <a:r>
-              <a:rPr kumimoji="1" lang="en-US" altLang="ja-JP" sz="1200" dirty="0">
-                <a:latin typeface="Courier" charset="0"/>
-                <a:ea typeface="Courier" charset="0"/>
-                <a:cs typeface="Courier" charset="0"/>
-              </a:rPr>
-              <a:t> –h</a:t>
-            </a:r>
-          </a:p>
-        </p:txBody>
-      </p:sp>
-      <p:sp>
-        <p:nvSpPr>
-          <p:cNvPr id="8" name="テキスト ボックス 7">
-            <a:extLst>
-              <a:ext uri="{FF2B5EF4-FFF2-40B4-BE49-F238E27FC236}">
-                <a16:creationId xmlns:a16="http://schemas.microsoft.com/office/drawing/2014/main" id="{A225B114-2527-2C43-BA74-E636F92F3BF0}"/>
-              </a:ext>
-            </a:extLst>
-          </p:cNvPr>
-          <p:cNvSpPr txBox="1"/>
-          <p:nvPr/>
-        </p:nvSpPr>
-        <p:spPr>
-          <a:xfrm>
-            <a:off x="1174068" y="2624197"/>
-            <a:ext cx="7269845" cy="646331"/>
-          </a:xfrm>
-          <a:prstGeom prst="rect">
-            <a:avLst/>
-          </a:prstGeom>
-          <a:noFill/>
-        </p:spPr>
-        <p:txBody>
-          <a:bodyPr wrap="square" rtlCol="0">
-            <a:spAutoFit/>
-          </a:bodyPr>
-          <a:lstStyle/>
-          <a:p>
-            <a:r>
-              <a:rPr lang="en-US" altLang="ja-JP" dirty="0"/>
-              <a:t>It is recommend to create an alias for a quick startup. Edit your ~/.</a:t>
-            </a:r>
-            <a:r>
-              <a:rPr lang="en-US" altLang="ja-JP" dirty="0" err="1"/>
-              <a:t>bashrc</a:t>
-            </a:r>
-            <a:r>
-              <a:rPr lang="en-US" altLang="ja-JP" dirty="0"/>
-              <a:t> and add the following two lines,</a:t>
-            </a:r>
-            <a:endParaRPr lang="ja-JP" altLang="en-US" dirty="0"/>
-          </a:p>
-        </p:txBody>
-      </p:sp>
-      <p:sp>
-        <p:nvSpPr>
-          <p:cNvPr id="9" name="テキスト ボックス 8">
-            <a:extLst>
-              <a:ext uri="{FF2B5EF4-FFF2-40B4-BE49-F238E27FC236}">
-                <a16:creationId xmlns:a16="http://schemas.microsoft.com/office/drawing/2014/main" id="{9EAE9D5E-0EA0-014E-849D-57437F47CFD2}"/>
-              </a:ext>
-            </a:extLst>
-          </p:cNvPr>
-          <p:cNvSpPr txBox="1"/>
-          <p:nvPr/>
-        </p:nvSpPr>
-        <p:spPr>
-          <a:xfrm>
-            <a:off x="1547813" y="3431389"/>
-            <a:ext cx="5205271" cy="461665"/>
-          </a:xfrm>
-          <a:prstGeom prst="rect">
-            <a:avLst/>
-          </a:prstGeom>
-          <a:noFill/>
-          <a:ln>
-            <a:solidFill>
-              <a:srgbClr val="00B050"/>
-            </a:solidFill>
-          </a:ln>
-        </p:spPr>
-        <p:txBody>
-          <a:bodyPr wrap="none" rtlCol="0">
-            <a:spAutoFit/>
-          </a:bodyPr>
-          <a:lstStyle/>
-          <a:p>
-            <a:r>
-              <a:rPr lang="en-US" altLang="ja-JP" sz="1200" dirty="0" err="1">
-                <a:latin typeface="Courier" charset="0"/>
-                <a:ea typeface="Courier" charset="0"/>
-                <a:cs typeface="Courier" charset="0"/>
-              </a:rPr>
-              <a:t>sindo_jar</a:t>
-            </a:r>
-            <a:r>
-              <a:rPr lang="en-US" altLang="ja-JP" sz="1200" dirty="0">
-                <a:latin typeface="Courier" charset="0"/>
-                <a:ea typeface="Courier" charset="0"/>
-                <a:cs typeface="Courier" charset="0"/>
-              </a:rPr>
-              <a:t>=/path/to/sindo-4.0/jar</a:t>
-            </a:r>
-          </a:p>
-          <a:p>
-            <a:r>
-              <a:rPr lang="en-US" altLang="ja-JP" sz="1200" dirty="0">
-                <a:latin typeface="Courier" charset="0"/>
-                <a:ea typeface="Courier" charset="0"/>
-                <a:cs typeface="Courier" charset="0"/>
-              </a:rPr>
-              <a:t>alias </a:t>
-            </a:r>
-            <a:r>
-              <a:rPr lang="en-US" altLang="ja-JP" sz="1200" dirty="0" err="1">
-                <a:latin typeface="Courier" charset="0"/>
-                <a:ea typeface="Courier" charset="0"/>
-                <a:cs typeface="Courier" charset="0"/>
-              </a:rPr>
-              <a:t>RunMakePES</a:t>
-            </a:r>
-            <a:r>
-              <a:rPr lang="en-US" altLang="ja-JP" sz="1200" dirty="0">
-                <a:latin typeface="Courier" charset="0"/>
-                <a:ea typeface="Courier" charset="0"/>
-                <a:cs typeface="Courier" charset="0"/>
-              </a:rPr>
-              <a:t>=‘java –</a:t>
-            </a:r>
-            <a:r>
-              <a:rPr lang="en-US" altLang="ja-JP" sz="1200" dirty="0" err="1">
-                <a:latin typeface="Courier" charset="0"/>
-                <a:ea typeface="Courier" charset="0"/>
-                <a:cs typeface="Courier" charset="0"/>
-              </a:rPr>
-              <a:t>cp</a:t>
-            </a:r>
-            <a:r>
-              <a:rPr lang="en-US" altLang="ja-JP" sz="1200" dirty="0">
-                <a:latin typeface="Courier" charset="0"/>
-                <a:ea typeface="Courier" charset="0"/>
-                <a:cs typeface="Courier" charset="0"/>
-              </a:rPr>
-              <a:t> “$</a:t>
-            </a:r>
-            <a:r>
-              <a:rPr lang="en-US" altLang="ja-JP" sz="1200" dirty="0" err="1">
-                <a:latin typeface="Courier" charset="0"/>
-                <a:ea typeface="Courier" charset="0"/>
-                <a:cs typeface="Courier" charset="0"/>
-              </a:rPr>
-              <a:t>sindo_jar</a:t>
-            </a:r>
-            <a:r>
-              <a:rPr lang="en-US" altLang="ja-JP" sz="1200" dirty="0">
-                <a:latin typeface="Courier" charset="0"/>
-                <a:ea typeface="Courier" charset="0"/>
-                <a:cs typeface="Courier" charset="0"/>
-              </a:rPr>
-              <a:t>/*” </a:t>
-            </a:r>
-            <a:r>
-              <a:rPr lang="en-US" altLang="ja-JP" sz="1200" dirty="0" err="1">
-                <a:latin typeface="Courier" charset="0"/>
-                <a:ea typeface="Courier" charset="0"/>
-                <a:cs typeface="Courier" charset="0"/>
-              </a:rPr>
-              <a:t>RunMakePES</a:t>
-            </a:r>
-            <a:r>
-              <a:rPr lang="en-US" altLang="ja-JP" sz="1200" dirty="0">
-                <a:latin typeface="Courier" charset="0"/>
-                <a:ea typeface="Courier" charset="0"/>
-                <a:cs typeface="Courier" charset="0"/>
-              </a:rPr>
-              <a:t>’</a:t>
-            </a:r>
-          </a:p>
-        </p:txBody>
-      </p:sp>
-      <p:sp>
-        <p:nvSpPr>
-          <p:cNvPr id="10" name="テキスト ボックス 9">
-            <a:extLst>
-              <a:ext uri="{FF2B5EF4-FFF2-40B4-BE49-F238E27FC236}">
-                <a16:creationId xmlns:a16="http://schemas.microsoft.com/office/drawing/2014/main" id="{BDFF4A7D-321F-1849-9D88-2B6592D4DA5B}"/>
-              </a:ext>
-            </a:extLst>
-          </p:cNvPr>
-          <p:cNvSpPr txBox="1"/>
-          <p:nvPr/>
-        </p:nvSpPr>
-        <p:spPr>
-          <a:xfrm>
-            <a:off x="1547813" y="4638899"/>
-            <a:ext cx="5670142" cy="646331"/>
-          </a:xfrm>
-          <a:prstGeom prst="rect">
-            <a:avLst/>
-          </a:prstGeom>
-          <a:noFill/>
-          <a:ln>
-            <a:solidFill>
-              <a:srgbClr val="00B050"/>
-            </a:solidFill>
-          </a:ln>
-        </p:spPr>
-        <p:txBody>
-          <a:bodyPr wrap="none" rtlCol="0">
-            <a:spAutoFit/>
-          </a:bodyPr>
-          <a:lstStyle/>
-          <a:p>
-            <a:r>
-              <a:rPr lang="en-US" altLang="ja-JP" sz="1200" dirty="0">
-                <a:latin typeface="Courier" charset="0"/>
-                <a:ea typeface="Courier" charset="0"/>
-                <a:cs typeface="Courier" charset="0"/>
-              </a:rPr>
-              <a:t>&gt; . ~/.</a:t>
-            </a:r>
-            <a:r>
-              <a:rPr lang="en-US" altLang="ja-JP" sz="1200" dirty="0" err="1">
-                <a:latin typeface="Courier" charset="0"/>
-                <a:ea typeface="Courier" charset="0"/>
-                <a:cs typeface="Courier" charset="0"/>
-              </a:rPr>
-              <a:t>basrc</a:t>
-            </a:r>
-            <a:endParaRPr lang="en-US" altLang="ja-JP" sz="1200" dirty="0">
-              <a:latin typeface="Courier" charset="0"/>
-              <a:ea typeface="Courier" charset="0"/>
-              <a:cs typeface="Courier" charset="0"/>
-            </a:endParaRPr>
-          </a:p>
-          <a:p>
-            <a:r>
-              <a:rPr lang="en-US" altLang="ja-JP" sz="1200" dirty="0">
-                <a:latin typeface="Courier" charset="0"/>
-                <a:ea typeface="Courier" charset="0"/>
-                <a:cs typeface="Courier" charset="0"/>
-              </a:rPr>
-              <a:t>&gt; </a:t>
-            </a:r>
-            <a:r>
-              <a:rPr lang="en-US" altLang="ja-JP" sz="1200" dirty="0" err="1">
-                <a:latin typeface="Courier" charset="0"/>
-                <a:ea typeface="Courier" charset="0"/>
-                <a:cs typeface="Courier" charset="0"/>
-              </a:rPr>
-              <a:t>RunMakePES</a:t>
-            </a:r>
-            <a:r>
-              <a:rPr lang="en-US" altLang="ja-JP" sz="1200" dirty="0">
-                <a:latin typeface="Courier" charset="0"/>
-                <a:ea typeface="Courier" charset="0"/>
-                <a:cs typeface="Courier" charset="0"/>
-              </a:rPr>
-              <a:t> -h</a:t>
-            </a:r>
-          </a:p>
-          <a:p>
-            <a:r>
-              <a:rPr lang="en-US" altLang="ja-JP" sz="1200" dirty="0">
-                <a:latin typeface="Courier" charset="0"/>
-                <a:ea typeface="Courier" charset="0"/>
-                <a:cs typeface="Courier" charset="0"/>
-              </a:rPr>
-              <a:t>USAGE: java </a:t>
-            </a:r>
-            <a:r>
-              <a:rPr lang="en-US" altLang="ja-JP" sz="1200" dirty="0" err="1">
-                <a:latin typeface="Courier" charset="0"/>
-                <a:ea typeface="Courier" charset="0"/>
-                <a:cs typeface="Courier" charset="0"/>
-              </a:rPr>
-              <a:t>RunMakePES</a:t>
-            </a:r>
-            <a:r>
-              <a:rPr lang="en-US" altLang="ja-JP" sz="1200" dirty="0">
-                <a:latin typeface="Courier" charset="0"/>
-                <a:ea typeface="Courier" charset="0"/>
-                <a:cs typeface="Courier" charset="0"/>
-              </a:rPr>
-              <a:t> [ -f </a:t>
-            </a:r>
-            <a:r>
-              <a:rPr lang="en-US" altLang="ja-JP" sz="1200" dirty="0" err="1">
-                <a:latin typeface="Courier" charset="0"/>
-                <a:ea typeface="Courier" charset="0"/>
-                <a:cs typeface="Courier" charset="0"/>
-              </a:rPr>
-              <a:t>xmlfile</a:t>
-            </a:r>
-            <a:r>
-              <a:rPr lang="en-US" altLang="ja-JP" sz="1200" dirty="0">
-                <a:latin typeface="Courier" charset="0"/>
-                <a:ea typeface="Courier" charset="0"/>
-                <a:cs typeface="Courier" charset="0"/>
-              </a:rPr>
-              <a:t> ] [--input-version 1|2]</a:t>
-            </a:r>
-          </a:p>
-        </p:txBody>
-      </p:sp>
-      <p:sp>
-        <p:nvSpPr>
-          <p:cNvPr id="11" name="テキスト ボックス 10">
-            <a:extLst>
-              <a:ext uri="{FF2B5EF4-FFF2-40B4-BE49-F238E27FC236}">
-                <a16:creationId xmlns:a16="http://schemas.microsoft.com/office/drawing/2014/main" id="{399F9E1C-A935-A14D-A96D-9FDD2548C982}"/>
-              </a:ext>
-            </a:extLst>
-          </p:cNvPr>
-          <p:cNvSpPr txBox="1"/>
-          <p:nvPr/>
-        </p:nvSpPr>
-        <p:spPr>
-          <a:xfrm>
-            <a:off x="1188355" y="4174215"/>
-            <a:ext cx="7486322" cy="369332"/>
-          </a:xfrm>
-          <a:prstGeom prst="rect">
-            <a:avLst/>
-          </a:prstGeom>
-          <a:noFill/>
-        </p:spPr>
-        <p:txBody>
-          <a:bodyPr wrap="square" rtlCol="0">
-            <a:spAutoFit/>
-          </a:bodyPr>
-          <a:lstStyle/>
-          <a:p>
-            <a:r>
-              <a:rPr lang="en-US" altLang="ja-JP" dirty="0"/>
-              <a:t>After source, you can invoke the program by typing </a:t>
-            </a:r>
-            <a:r>
-              <a:rPr lang="en-US" altLang="ja-JP" dirty="0" err="1"/>
-              <a:t>RunMakePES</a:t>
-            </a:r>
-            <a:endParaRPr kumimoji="1" lang="ja-JP" altLang="en-US" dirty="0"/>
-          </a:p>
-        </p:txBody>
-      </p:sp>
     </p:spTree>
     <p:extLst>
       <p:ext uri="{BB962C8B-B14F-4D97-AF65-F5344CB8AC3E}">
-        <p14:creationId xmlns:p14="http://schemas.microsoft.com/office/powerpoint/2010/main" val="4159341620"/>
-      </p:ext>
-    </p:extLst>
-  </p:cSld>
-  <p:clrMapOvr>
-    <a:masterClrMapping/>
-  </p:clrMapOvr>
-</p:sld>
-</file>
-
-<file path=ppt/slides/slide5.xml><?xml version="1.0" encoding="utf-8"?>
-<p:sld xmlns:a="http://schemas.openxmlformats.org/drawingml/2006/main" xmlns:r="http://schemas.openxmlformats.org/officeDocument/2006/relationships" xmlns:p="http://schemas.openxmlformats.org/presentationml/2006/main">
-  <p:cSld>
-    <p:spTree>
-      <p:nvGrpSpPr>
-        <p:cNvPr id="1" name=""/>
-        <p:cNvGrpSpPr/>
-        <p:nvPr/>
-      </p:nvGrpSpPr>
-      <p:grpSpPr>
-        <a:xfrm>
-          <a:off x="0" y="0"/>
-          <a:ext cx="0" cy="0"/>
-          <a:chOff x="0" y="0"/>
-          <a:chExt cx="0" cy="0"/>
-        </a:xfrm>
-      </p:grpSpPr>
-      <p:sp>
-        <p:nvSpPr>
-          <p:cNvPr id="2" name="スライド番号プレースホルダー 1">
-            <a:extLst>
-              <a:ext uri="{FF2B5EF4-FFF2-40B4-BE49-F238E27FC236}">
-                <a16:creationId xmlns:a16="http://schemas.microsoft.com/office/drawing/2014/main" id="{65E3D56F-0F54-0A4A-B6C4-9A1B78F9A7EA}"/>
-              </a:ext>
-            </a:extLst>
-          </p:cNvPr>
-          <p:cNvSpPr>
-            <a:spLocks noGrp="1"/>
-          </p:cNvSpPr>
-          <p:nvPr>
-            <p:ph type="sldNum" sz="quarter" idx="12"/>
-          </p:nvPr>
-        </p:nvSpPr>
-        <p:spPr/>
-        <p:txBody>
-          <a:bodyPr/>
-          <a:lstStyle/>
-          <a:p>
-            <a:fld id="{7D34BB6B-1E1A-9541-9560-488905BF54FF}" type="slidenum">
-              <a:rPr kumimoji="1" lang="ja-JP" altLang="en-US" smtClean="0"/>
-              <a:t>4</a:t>
-            </a:fld>
-            <a:endParaRPr kumimoji="1" lang="ja-JP" altLang="en-US"/>
-          </a:p>
-        </p:txBody>
-      </p:sp>
-      <p:sp>
-        <p:nvSpPr>
-          <p:cNvPr id="3" name="テキスト ボックス 2">
-            <a:extLst>
-              <a:ext uri="{FF2B5EF4-FFF2-40B4-BE49-F238E27FC236}">
-                <a16:creationId xmlns:a16="http://schemas.microsoft.com/office/drawing/2014/main" id="{1202BCDA-16CA-7B48-AEE1-4436FA1337B7}"/>
-              </a:ext>
-            </a:extLst>
-          </p:cNvPr>
-          <p:cNvSpPr txBox="1"/>
-          <p:nvPr/>
-        </p:nvSpPr>
-        <p:spPr>
-          <a:xfrm>
-            <a:off x="827315" y="439773"/>
-            <a:ext cx="7696754" cy="4801314"/>
-          </a:xfrm>
-          <a:prstGeom prst="rect">
-            <a:avLst/>
-          </a:prstGeom>
-          <a:noFill/>
-        </p:spPr>
-        <p:txBody>
-          <a:bodyPr wrap="square" rtlCol="0">
-            <a:spAutoFit/>
-          </a:bodyPr>
-          <a:lstStyle/>
-          <a:p>
-            <a:pPr marL="342900" indent="-342900">
-              <a:buFont typeface="+mj-lt"/>
-              <a:buAutoNum type="arabicPeriod" startAt="6"/>
-            </a:pPr>
-            <a:r>
-              <a:rPr lang="en-US" altLang="ja-JP" dirty="0"/>
-              <a:t>Configuration for Gaussian</a:t>
-            </a:r>
-          </a:p>
-          <a:p>
-            <a:pPr marL="342900" indent="-342900">
-              <a:buFont typeface="+mj-lt"/>
-              <a:buAutoNum type="arabicPeriod" startAt="6"/>
-            </a:pPr>
-            <a:endParaRPr lang="en-US" altLang="ja-JP" dirty="0"/>
-          </a:p>
-          <a:p>
-            <a:pPr lvl="1"/>
-            <a:endParaRPr lang="en-US" altLang="ja-JP" dirty="0"/>
-          </a:p>
-          <a:p>
-            <a:pPr lvl="1"/>
-            <a:endParaRPr lang="en-US" altLang="ja-JP" dirty="0"/>
-          </a:p>
-          <a:p>
-            <a:pPr lvl="1"/>
-            <a:endParaRPr lang="en-US" altLang="ja-JP" dirty="0"/>
-          </a:p>
-          <a:p>
-            <a:pPr lvl="1"/>
-            <a:r>
-              <a:rPr lang="en-US" altLang="ja-JP" dirty="0"/>
-              <a:t>Go to a folder “script”, execute a configure script, and follow the instruction,</a:t>
-            </a:r>
-          </a:p>
-          <a:p>
-            <a:pPr lvl="1"/>
-            <a:endParaRPr lang="en-US" altLang="ja-JP" dirty="0"/>
-          </a:p>
-          <a:p>
-            <a:pPr lvl="1"/>
-            <a:endParaRPr lang="en-US" altLang="ja-JP" dirty="0"/>
-          </a:p>
-          <a:p>
-            <a:pPr lvl="1"/>
-            <a:endParaRPr lang="en-US" altLang="ja-JP" dirty="0"/>
-          </a:p>
-          <a:p>
-            <a:pPr lvl="1"/>
-            <a:r>
-              <a:rPr lang="en-US" altLang="ja-JP" dirty="0"/>
-              <a:t>You will be asked to enter a folder where Gaussian is installed, the version of Gaussian, and a local scratch folder. The script creates </a:t>
-            </a:r>
-            <a:r>
-              <a:rPr lang="en-US" altLang="ja-JP" dirty="0" err="1"/>
-              <a:t>runGaussian.sh</a:t>
-            </a:r>
-            <a:r>
-              <a:rPr lang="en-US" altLang="ja-JP" dirty="0"/>
-              <a:t> in the same folder. Set a path to this folder so that </a:t>
-            </a:r>
-            <a:r>
-              <a:rPr lang="en-US" altLang="ja-JP" dirty="0" err="1"/>
-              <a:t>MakePES</a:t>
-            </a:r>
-            <a:r>
-              <a:rPr lang="en-US" altLang="ja-JP" dirty="0"/>
-              <a:t> can use </a:t>
-            </a:r>
-            <a:r>
-              <a:rPr lang="en-US" altLang="ja-JP" dirty="0" err="1"/>
-              <a:t>runGaussian.sh</a:t>
-            </a:r>
-            <a:r>
-              <a:rPr lang="en-US" altLang="ja-JP" dirty="0"/>
-              <a:t>.</a:t>
-            </a:r>
-          </a:p>
-          <a:p>
-            <a:pPr lvl="1"/>
-            <a:endParaRPr lang="en-US" altLang="ja-JP" dirty="0"/>
-          </a:p>
-          <a:p>
-            <a:pPr lvl="1"/>
-            <a:endParaRPr lang="en-US" altLang="ja-JP" dirty="0"/>
-          </a:p>
-          <a:p>
-            <a:pPr lvl="1"/>
-            <a:endParaRPr lang="en-US" altLang="ja-JP" dirty="0"/>
-          </a:p>
-          <a:p>
-            <a:pPr lvl="1"/>
-            <a:r>
-              <a:rPr lang="en-US" altLang="ja-JP" dirty="0"/>
-              <a:t>Again, it is recommended to add this line to ~/.</a:t>
-            </a:r>
-            <a:r>
-              <a:rPr lang="en-US" altLang="ja-JP" dirty="0" err="1"/>
-              <a:t>bashrc</a:t>
-            </a:r>
-            <a:r>
-              <a:rPr lang="en-US" altLang="ja-JP" dirty="0"/>
-              <a:t>.</a:t>
-            </a:r>
-          </a:p>
-        </p:txBody>
-      </p:sp>
-      <p:sp>
-        <p:nvSpPr>
-          <p:cNvPr id="5" name="テキスト ボックス 4">
-            <a:extLst>
-              <a:ext uri="{FF2B5EF4-FFF2-40B4-BE49-F238E27FC236}">
-                <a16:creationId xmlns:a16="http://schemas.microsoft.com/office/drawing/2014/main" id="{1D266660-C130-E747-8854-57140BE5044E}"/>
-              </a:ext>
-            </a:extLst>
-          </p:cNvPr>
-          <p:cNvSpPr txBox="1"/>
-          <p:nvPr/>
-        </p:nvSpPr>
-        <p:spPr>
-          <a:xfrm>
-            <a:off x="1557964" y="2287017"/>
-            <a:ext cx="2137124" cy="461665"/>
-          </a:xfrm>
-          <a:prstGeom prst="rect">
-            <a:avLst/>
-          </a:prstGeom>
-          <a:noFill/>
-          <a:ln>
-            <a:solidFill>
-              <a:srgbClr val="00B050"/>
-            </a:solidFill>
-          </a:ln>
-        </p:spPr>
-        <p:txBody>
-          <a:bodyPr wrap="none" rtlCol="0">
-            <a:spAutoFit/>
-          </a:bodyPr>
-          <a:lstStyle/>
-          <a:p>
-            <a:r>
-              <a:rPr lang="en-US" altLang="ja-JP" sz="1200" dirty="0">
-                <a:latin typeface="Courier" charset="0"/>
-                <a:ea typeface="Courier" charset="0"/>
-                <a:cs typeface="Courier" charset="0"/>
-              </a:rPr>
-              <a:t>&gt; cd sindo-4.0/script</a:t>
-            </a:r>
-          </a:p>
-          <a:p>
-            <a:r>
-              <a:rPr kumimoji="1" lang="en-US" altLang="ja-JP" sz="1200" dirty="0">
-                <a:latin typeface="Courier" charset="0"/>
-                <a:ea typeface="Courier" charset="0"/>
-                <a:cs typeface="Courier" charset="0"/>
-              </a:rPr>
-              <a:t>&gt; ./configure</a:t>
-            </a:r>
-          </a:p>
-        </p:txBody>
-      </p:sp>
-      <p:sp>
-        <p:nvSpPr>
-          <p:cNvPr id="6" name="テキスト ボックス 5">
-            <a:extLst>
-              <a:ext uri="{FF2B5EF4-FFF2-40B4-BE49-F238E27FC236}">
-                <a16:creationId xmlns:a16="http://schemas.microsoft.com/office/drawing/2014/main" id="{7DCEB447-102D-D643-A988-5D730F2BE42A}"/>
-              </a:ext>
-            </a:extLst>
-          </p:cNvPr>
-          <p:cNvSpPr txBox="1"/>
-          <p:nvPr/>
-        </p:nvSpPr>
-        <p:spPr>
-          <a:xfrm>
-            <a:off x="1557964" y="4320902"/>
-            <a:ext cx="4554452" cy="276999"/>
-          </a:xfrm>
-          <a:prstGeom prst="rect">
-            <a:avLst/>
-          </a:prstGeom>
-          <a:noFill/>
-          <a:ln>
-            <a:solidFill>
-              <a:srgbClr val="00B050"/>
-            </a:solidFill>
-          </a:ln>
-        </p:spPr>
-        <p:txBody>
-          <a:bodyPr wrap="none" rtlCol="0">
-            <a:spAutoFit/>
-          </a:bodyPr>
-          <a:lstStyle/>
-          <a:p>
-            <a:r>
-              <a:rPr lang="en-US" altLang="ja-JP" sz="1200" dirty="0">
-                <a:latin typeface="Courier" charset="0"/>
-                <a:ea typeface="Courier" charset="0"/>
-                <a:cs typeface="Courier" charset="0"/>
-              </a:rPr>
-              <a:t>&gt; export PATH=${PATH}:/path/to/sindo-4.0/script</a:t>
-            </a:r>
-            <a:endParaRPr kumimoji="1" lang="en-US" altLang="ja-JP" sz="1200" dirty="0">
-              <a:latin typeface="Courier" charset="0"/>
-              <a:ea typeface="Courier" charset="0"/>
-              <a:cs typeface="Courier" charset="0"/>
-            </a:endParaRPr>
-          </a:p>
-        </p:txBody>
-      </p:sp>
-      <p:sp>
-        <p:nvSpPr>
-          <p:cNvPr id="7" name="テキスト ボックス 6">
-            <a:extLst>
-              <a:ext uri="{FF2B5EF4-FFF2-40B4-BE49-F238E27FC236}">
-                <a16:creationId xmlns:a16="http://schemas.microsoft.com/office/drawing/2014/main" id="{CC876D26-885B-044C-BBB6-E0D3D6B24422}"/>
-              </a:ext>
-            </a:extLst>
-          </p:cNvPr>
-          <p:cNvSpPr txBox="1"/>
-          <p:nvPr/>
-        </p:nvSpPr>
-        <p:spPr>
-          <a:xfrm>
-            <a:off x="1271584" y="985839"/>
-            <a:ext cx="6972304" cy="646331"/>
-          </a:xfrm>
-          <a:prstGeom prst="rect">
-            <a:avLst/>
-          </a:prstGeom>
-          <a:noFill/>
-          <a:ln>
-            <a:solidFill>
-              <a:schemeClr val="accent1"/>
-            </a:solidFill>
-          </a:ln>
-        </p:spPr>
-        <p:txBody>
-          <a:bodyPr wrap="square" rtlCol="0">
-            <a:spAutoFit/>
-          </a:bodyPr>
-          <a:lstStyle/>
-          <a:p>
-            <a:r>
-              <a:rPr lang="en-US" altLang="ja-JP" dirty="0"/>
-              <a:t>Note: You can skip this step if you don’t plan to use Gaussian, or if you run Gaussian by yourself.</a:t>
-            </a:r>
-            <a:endParaRPr kumimoji="1" lang="ja-JP" altLang="en-US"/>
-          </a:p>
-        </p:txBody>
-      </p:sp>
-    </p:spTree>
-    <p:extLst>
-      <p:ext uri="{BB962C8B-B14F-4D97-AF65-F5344CB8AC3E}">
-        <p14:creationId xmlns:p14="http://schemas.microsoft.com/office/powerpoint/2010/main" val="2946564859"/>
+        <p14:creationId xmlns:p14="http://schemas.microsoft.com/office/powerpoint/2010/main" val="3872705347"/>
       </p:ext>
     </p:extLst>
   </p:cSld>

</xml_diff>